<commit_message>
added padding and changed labels
</commit_message>
<xml_diff>
--- a/Experiments/relative_judgments/draw_instructions.pptx
+++ b/Experiments/relative_judgments/draw_instructions.pptx
@@ -209,7 +209,7 @@
           <a:p>
             <a:fld id="{B3D1F5A6-33BB-9F4E-9C59-2A3D50235D3A}" type="datetimeFigureOut">
               <a:rPr lang="en-US" smtClean="0"/>
-              <a:t>8/29/19</a:t>
+              <a:t>2/9/20</a:t>
             </a:fld>
             <a:endParaRPr lang="en-US"/>
           </a:p>
@@ -1765,7 +1765,7 @@
           <a:p>
             <a:fld id="{E02736CB-4232-A146-B165-19378F549313}" type="datetimeFigureOut">
               <a:rPr lang="en-US" smtClean="0"/>
-              <a:t>8/29/19</a:t>
+              <a:t>2/9/20</a:t>
             </a:fld>
             <a:endParaRPr lang="en-US"/>
           </a:p>
@@ -1930,7 +1930,7 @@
           <a:p>
             <a:fld id="{E02736CB-4232-A146-B165-19378F549313}" type="datetimeFigureOut">
               <a:rPr lang="en-US" smtClean="0"/>
-              <a:t>8/29/19</a:t>
+              <a:t>2/9/20</a:t>
             </a:fld>
             <a:endParaRPr lang="en-US"/>
           </a:p>
@@ -2105,7 +2105,7 @@
           <a:p>
             <a:fld id="{E02736CB-4232-A146-B165-19378F549313}" type="datetimeFigureOut">
               <a:rPr lang="en-US" smtClean="0"/>
-              <a:t>8/29/19</a:t>
+              <a:t>2/9/20</a:t>
             </a:fld>
             <a:endParaRPr lang="en-US"/>
           </a:p>
@@ -2270,7 +2270,7 @@
           <a:p>
             <a:fld id="{E02736CB-4232-A146-B165-19378F549313}" type="datetimeFigureOut">
               <a:rPr lang="en-US" smtClean="0"/>
-              <a:t>8/29/19</a:t>
+              <a:t>2/9/20</a:t>
             </a:fld>
             <a:endParaRPr lang="en-US"/>
           </a:p>
@@ -2509,7 +2509,7 @@
           <a:p>
             <a:fld id="{E02736CB-4232-A146-B165-19378F549313}" type="datetimeFigureOut">
               <a:rPr lang="en-US" smtClean="0"/>
-              <a:t>8/29/19</a:t>
+              <a:t>2/9/20</a:t>
             </a:fld>
             <a:endParaRPr lang="en-US"/>
           </a:p>
@@ -2736,7 +2736,7 @@
           <a:p>
             <a:fld id="{E02736CB-4232-A146-B165-19378F549313}" type="datetimeFigureOut">
               <a:rPr lang="en-US" smtClean="0"/>
-              <a:t>8/29/19</a:t>
+              <a:t>2/9/20</a:t>
             </a:fld>
             <a:endParaRPr lang="en-US"/>
           </a:p>
@@ -3098,7 +3098,7 @@
           <a:p>
             <a:fld id="{E02736CB-4232-A146-B165-19378F549313}" type="datetimeFigureOut">
               <a:rPr lang="en-US" smtClean="0"/>
-              <a:t>8/29/19</a:t>
+              <a:t>2/9/20</a:t>
             </a:fld>
             <a:endParaRPr lang="en-US"/>
           </a:p>
@@ -3211,7 +3211,7 @@
           <a:p>
             <a:fld id="{E02736CB-4232-A146-B165-19378F549313}" type="datetimeFigureOut">
               <a:rPr lang="en-US" smtClean="0"/>
-              <a:t>8/29/19</a:t>
+              <a:t>2/9/20</a:t>
             </a:fld>
             <a:endParaRPr lang="en-US"/>
           </a:p>
@@ -3301,7 +3301,7 @@
           <a:p>
             <a:fld id="{E02736CB-4232-A146-B165-19378F549313}" type="datetimeFigureOut">
               <a:rPr lang="en-US" smtClean="0"/>
-              <a:t>8/29/19</a:t>
+              <a:t>2/9/20</a:t>
             </a:fld>
             <a:endParaRPr lang="en-US"/>
           </a:p>
@@ -3573,7 +3573,7 @@
           <a:p>
             <a:fld id="{E02736CB-4232-A146-B165-19378F549313}" type="datetimeFigureOut">
               <a:rPr lang="en-US" smtClean="0"/>
-              <a:t>8/29/19</a:t>
+              <a:t>2/9/20</a:t>
             </a:fld>
             <a:endParaRPr lang="en-US"/>
           </a:p>
@@ -3825,7 +3825,7 @@
           <a:p>
             <a:fld id="{E02736CB-4232-A146-B165-19378F549313}" type="datetimeFigureOut">
               <a:rPr lang="en-US" smtClean="0"/>
-              <a:t>8/29/19</a:t>
+              <a:t>2/9/20</a:t>
             </a:fld>
             <a:endParaRPr lang="en-US"/>
           </a:p>
@@ -4033,7 +4033,7 @@
           <a:p>
             <a:fld id="{E02736CB-4232-A146-B165-19378F549313}" type="datetimeFigureOut">
               <a:rPr lang="en-US" smtClean="0"/>
-              <a:t>8/29/19</a:t>
+              <a:t>2/9/20</a:t>
             </a:fld>
             <a:endParaRPr lang="en-US"/>
           </a:p>
@@ -4562,7 +4562,7 @@
                   <a:srgbClr val="C00000"/>
                 </a:solidFill>
               </a:rPr>
-              <a:t>Y</a:t>
+              <a:t>D</a:t>
             </a:r>
             <a:endParaRPr lang="en-US" sz="6666" dirty="0">
               <a:solidFill>
@@ -4766,7 +4766,7 @@
                   <a:srgbClr val="C00000"/>
                 </a:solidFill>
               </a:rPr>
-              <a:t>Z</a:t>
+              <a:t>Y</a:t>
             </a:r>
             <a:endParaRPr lang="en-US" sz="6666" dirty="0">
               <a:solidFill>
@@ -4833,7 +4833,7 @@
                   <a:srgbClr val="C00000"/>
                 </a:solidFill>
               </a:rPr>
-              <a:t>Y</a:t>
+              <a:t>D</a:t>
             </a:r>
             <a:endParaRPr lang="en-US" sz="6666" dirty="0">
               <a:solidFill>
@@ -5184,7 +5184,7 @@
                   <a:srgbClr val="C00000"/>
                 </a:solidFill>
               </a:rPr>
-              <a:t>Z</a:t>
+              <a:t>Y</a:t>
             </a:r>
             <a:endParaRPr lang="en-US" sz="6666" dirty="0">
               <a:solidFill>
@@ -5251,7 +5251,7 @@
                   <a:srgbClr val="C00000"/>
                 </a:solidFill>
               </a:rPr>
-              <a:t>Y</a:t>
+              <a:t>D</a:t>
             </a:r>
             <a:endParaRPr lang="en-US" sz="6666" dirty="0">
               <a:solidFill>
@@ -5495,7 +5495,7 @@
                   <a:srgbClr val="C00000"/>
                 </a:solidFill>
               </a:rPr>
-              <a:t>Z</a:t>
+              <a:t>Y</a:t>
             </a:r>
             <a:endParaRPr lang="en-US" sz="6666" dirty="0">
               <a:solidFill>
@@ -5562,7 +5562,7 @@
                   <a:srgbClr val="C00000"/>
                 </a:solidFill>
               </a:rPr>
-              <a:t>Y</a:t>
+              <a:t>D</a:t>
             </a:r>
             <a:endParaRPr lang="en-US" sz="6666" dirty="0">
               <a:solidFill>
@@ -5806,7 +5806,7 @@
                   <a:srgbClr val="C00000"/>
                 </a:solidFill>
               </a:rPr>
-              <a:t>Z</a:t>
+              <a:t>Y</a:t>
             </a:r>
             <a:endParaRPr lang="en-US" sz="6666" dirty="0">
               <a:solidFill>
@@ -5873,7 +5873,7 @@
                   <a:srgbClr val="C00000"/>
                 </a:solidFill>
               </a:rPr>
-              <a:t>Y</a:t>
+              <a:t>D</a:t>
             </a:r>
             <a:endParaRPr lang="en-US" sz="6666" dirty="0">
               <a:solidFill>
@@ -6117,7 +6117,7 @@
                   <a:srgbClr val="C00000"/>
                 </a:solidFill>
               </a:rPr>
-              <a:t>Y</a:t>
+              <a:t>D</a:t>
             </a:r>
             <a:endParaRPr lang="en-US" sz="6666" dirty="0">
               <a:solidFill>
@@ -6321,7 +6321,7 @@
                   <a:srgbClr val="C00000"/>
                 </a:solidFill>
               </a:rPr>
-              <a:t>Y</a:t>
+              <a:t>D</a:t>
             </a:r>
             <a:endParaRPr lang="en-US" sz="6666" dirty="0">
               <a:solidFill>
@@ -6525,7 +6525,7 @@
                   <a:srgbClr val="C00000"/>
                 </a:solidFill>
               </a:rPr>
-              <a:t>Z</a:t>
+              <a:t>Y</a:t>
             </a:r>
             <a:endParaRPr lang="en-US" sz="6666" dirty="0">
               <a:solidFill>
@@ -6592,7 +6592,7 @@
                   <a:srgbClr val="C00000"/>
                 </a:solidFill>
               </a:rPr>
-              <a:t>Y</a:t>
+              <a:t>D</a:t>
             </a:r>
             <a:endParaRPr lang="en-US" sz="6666" dirty="0">
               <a:solidFill>
@@ -7244,7 +7244,7 @@
                   <a:srgbClr val="C00000"/>
                 </a:solidFill>
               </a:rPr>
-              <a:t>Z</a:t>
+              <a:t>Y</a:t>
             </a:r>
             <a:endParaRPr lang="en-US" sz="6666" dirty="0">
               <a:solidFill>
@@ -7417,7 +7417,7 @@
                   <a:srgbClr val="C00000"/>
                 </a:solidFill>
               </a:rPr>
-              <a:t>Y</a:t>
+              <a:t>D</a:t>
             </a:r>
             <a:endParaRPr lang="en-US" sz="6666" dirty="0">
               <a:solidFill>

</xml_diff>